<commit_message>
fixed issue with changing LED card slot where it would display two dialogs to the user
</commit_message>
<xml_diff>
--- a/Documentation/SLSC Configuration Custom Device.pptx
+++ b/Documentation/SLSC Configuration Custom Device.pptx
@@ -8,7 +8,7 @@
     <p:sldMasterId id="2147483722" r:id="rId4"/>
   </p:sldMasterIdLst>
   <p:notesMasterIdLst>
-    <p:notesMasterId r:id="rId22"/>
+    <p:notesMasterId r:id="rId23"/>
   </p:notesMasterIdLst>
   <p:sldIdLst>
     <p:sldId id="256" r:id="rId5"/>
@@ -26,8 +26,9 @@
     <p:sldId id="266" r:id="rId17"/>
     <p:sldId id="267" r:id="rId18"/>
     <p:sldId id="268" r:id="rId19"/>
-    <p:sldId id="269" r:id="rId20"/>
-    <p:sldId id="270" r:id="rId21"/>
+    <p:sldId id="273" r:id="rId20"/>
+    <p:sldId id="269" r:id="rId21"/>
+    <p:sldId id="270" r:id="rId22"/>
   </p:sldIdLst>
   <p:sldSz cx="9144000" cy="6858000" type="screen4x3"/>
   <p:notesSz cx="7315200" cy="9601200"/>
@@ -252,7 +253,7 @@
           <a:p>
             <a:fld id="{6F64EA44-E7B4-4E71-B65C-EAE4DEE08EEF}" type="datetimeFigureOut">
               <a:rPr lang="en-US" smtClean="0"/>
-              <a:t>6/1/2015</a:t>
+              <a:t>6/3/2015</a:t>
             </a:fld>
             <a:endParaRPr lang="en-US"/>
           </a:p>
@@ -700,39 +701,15 @@
           <a:bodyPr/>
           <a:lstStyle/>
           <a:p>
-            <a:pPr marL="0" marR="0" lvl="3" indent="0" algn="l" defTabSz="914400" rtl="0" eaLnBrk="1" fontAlgn="auto" latinLnBrk="0" hangingPunct="1">
-              <a:lnSpc>
-                <a:spcPct val="100000"/>
-              </a:lnSpc>
-              <a:spcBef>
-                <a:spcPts val="0"/>
-              </a:spcBef>
-              <a:spcAft>
-                <a:spcPts val="0"/>
-              </a:spcAft>
-              <a:buClrTx/>
-              <a:buSzTx/>
-              <a:buFontTx/>
-              <a:buNone/>
-              <a:tabLst/>
-              <a:defRPr/>
-            </a:pPr>
-            <a:r>
-              <a:rPr lang="en-US" dirty="0" smtClean="0"/>
-              <a:t>The Resistor </a:t>
+            <a:r>
+              <a:rPr lang="en-US" dirty="0" smtClean="0"/>
+              <a:t>LEDs</a:t>
             </a:r>
             <a:r>
               <a:rPr lang="en-US" baseline="0" dirty="0" smtClean="0"/>
-              <a:t>card is used to set the resistances of up to 8 channels. Resistances can range from 2-8193.875 Ohms (this is due to serializing resistors). You can set the initial state for each of the 8 resistances in the main page of the Resistor card or you can update the resistances individually in the channels. </a:t>
-            </a:r>
-            <a:r>
-              <a:rPr lang="en-US" b="0" baseline="0" dirty="0" smtClean="0"/>
-              <a:t>The user may also change the rack and slot position.</a:t>
-            </a:r>
-            <a:endParaRPr lang="en-US" b="1" dirty="0" smtClean="0"/>
-          </a:p>
-          <a:p>
-            <a:endParaRPr lang="en-US" b="1" dirty="0"/>
+              <a:t> on the backplane are for user feedback. The user can map digital lines to these LEDs.</a:t>
+            </a:r>
+            <a:endParaRPr lang="en-US" dirty="0"/>
           </a:p>
         </p:txBody>
       </p:sp>
@@ -752,26 +729,17 @@
           <a:lstStyle/>
           <a:p>
             <a:fld id="{C4AC0521-0938-4E7C-B440-EFBADEF5D8F8}" type="slidenum">
-              <a:rPr lang="en-US" smtClean="0">
-                <a:solidFill>
-                  <a:prstClr val="black"/>
-                </a:solidFill>
-              </a:rPr>
-              <a:pPr/>
+              <a:rPr lang="en-US" smtClean="0"/>
               <a:t>16</a:t>
             </a:fld>
-            <a:endParaRPr lang="en-US">
-              <a:solidFill>
-                <a:prstClr val="black"/>
-              </a:solidFill>
-            </a:endParaRPr>
+            <a:endParaRPr lang="en-US"/>
           </a:p>
         </p:txBody>
       </p:sp>
     </p:spTree>
     <p:extLst>
       <p:ext uri="{BB962C8B-B14F-4D97-AF65-F5344CB8AC3E}">
-        <p14:creationId xmlns:p14="http://schemas.microsoft.com/office/powerpoint/2010/main" val="3161270954"/>
+        <p14:creationId xmlns:p14="http://schemas.microsoft.com/office/powerpoint/2010/main" val="600098286"/>
       </p:ext>
     </p:extLst>
   </p:cSld>
@@ -844,11 +812,11 @@
             </a:pPr>
             <a:r>
               <a:rPr lang="en-US" dirty="0" smtClean="0"/>
-              <a:t>The Wheel Speed Sensor </a:t>
+              <a:t>The Resistor </a:t>
             </a:r>
             <a:r>
               <a:rPr lang="en-US" baseline="0" dirty="0" smtClean="0"/>
-              <a:t>card is used to set the modes for 4 channels. Mode can be either Current or Voltage mode. You can set the initial state for each of the 4 channels in the main page of the Wheel Speed Sensor card or you can update the modes individually in the channels. </a:t>
+              <a:t>card is used to set the resistances of up to 8 channels. Resistances can range from 2-8193.875 Ohms (this is due to serializing resistors). You can set the initial state for each of the 8 resistances in the main page of the Resistor card or you can update the resistances individually in the channels. </a:t>
             </a:r>
             <a:r>
               <a:rPr lang="en-US" b="0" baseline="0" dirty="0" smtClean="0"/>
@@ -884,6 +852,131 @@
               </a:rPr>
               <a:pPr/>
               <a:t>17</a:t>
+            </a:fld>
+            <a:endParaRPr lang="en-US">
+              <a:solidFill>
+                <a:prstClr val="black"/>
+              </a:solidFill>
+            </a:endParaRPr>
+          </a:p>
+        </p:txBody>
+      </p:sp>
+    </p:spTree>
+    <p:extLst>
+      <p:ext uri="{BB962C8B-B14F-4D97-AF65-F5344CB8AC3E}">
+        <p14:creationId xmlns:p14="http://schemas.microsoft.com/office/powerpoint/2010/main" val="3161270954"/>
+      </p:ext>
+    </p:extLst>
+  </p:cSld>
+  <p:clrMapOvr>
+    <a:masterClrMapping/>
+  </p:clrMapOvr>
+</p:notes>
+</file>
+
+<file path=ppt/notesSlides/notesSlide12.xml><?xml version="1.0" encoding="utf-8"?>
+<p:notes xmlns:a="http://schemas.openxmlformats.org/drawingml/2006/main" xmlns:r="http://schemas.openxmlformats.org/officeDocument/2006/relationships" xmlns:p="http://schemas.openxmlformats.org/presentationml/2006/main">
+  <p:cSld>
+    <p:spTree>
+      <p:nvGrpSpPr>
+        <p:cNvPr id="1" name=""/>
+        <p:cNvGrpSpPr/>
+        <p:nvPr/>
+      </p:nvGrpSpPr>
+      <p:grpSpPr>
+        <a:xfrm>
+          <a:off x="0" y="0"/>
+          <a:ext cx="0" cy="0"/>
+          <a:chOff x="0" y="0"/>
+          <a:chExt cx="0" cy="0"/>
+        </a:xfrm>
+      </p:grpSpPr>
+      <p:sp>
+        <p:nvSpPr>
+          <p:cNvPr id="2" name="Slide Image Placeholder 1"/>
+          <p:cNvSpPr>
+            <a:spLocks noGrp="1" noRot="1" noChangeAspect="1"/>
+          </p:cNvSpPr>
+          <p:nvPr>
+            <p:ph type="sldImg"/>
+          </p:nvPr>
+        </p:nvSpPr>
+        <p:spPr/>
+      </p:sp>
+      <p:sp>
+        <p:nvSpPr>
+          <p:cNvPr id="3" name="Notes Placeholder 2"/>
+          <p:cNvSpPr>
+            <a:spLocks noGrp="1"/>
+          </p:cNvSpPr>
+          <p:nvPr>
+            <p:ph type="body" idx="1"/>
+          </p:nvPr>
+        </p:nvSpPr>
+        <p:spPr/>
+        <p:txBody>
+          <a:bodyPr/>
+          <a:lstStyle/>
+          <a:p>
+            <a:pPr marL="0" marR="0" lvl="3" indent="0" algn="l" defTabSz="914400" rtl="0" eaLnBrk="1" fontAlgn="auto" latinLnBrk="0" hangingPunct="1">
+              <a:lnSpc>
+                <a:spcPct val="100000"/>
+              </a:lnSpc>
+              <a:spcBef>
+                <a:spcPts val="0"/>
+              </a:spcBef>
+              <a:spcAft>
+                <a:spcPts val="0"/>
+              </a:spcAft>
+              <a:buClrTx/>
+              <a:buSzTx/>
+              <a:buFontTx/>
+              <a:buNone/>
+              <a:tabLst/>
+              <a:defRPr/>
+            </a:pPr>
+            <a:r>
+              <a:rPr lang="en-US" dirty="0" smtClean="0"/>
+              <a:t>The Wheel Speed Sensor </a:t>
+            </a:r>
+            <a:r>
+              <a:rPr lang="en-US" baseline="0" dirty="0" smtClean="0"/>
+              <a:t>card is used to set the modes for 4 channels. Mode can be either Current or Voltage mode. You can set the initial state for each of the 4 channels in the main page of the Wheel Speed Sensor card or you can update the modes individually in the channels. </a:t>
+            </a:r>
+            <a:r>
+              <a:rPr lang="en-US" b="0" baseline="0" dirty="0" smtClean="0"/>
+              <a:t>The user may also change the rack and slot position.</a:t>
+            </a:r>
+            <a:endParaRPr lang="en-US" b="1" dirty="0" smtClean="0"/>
+          </a:p>
+          <a:p>
+            <a:endParaRPr lang="en-US" b="1" dirty="0"/>
+          </a:p>
+        </p:txBody>
+      </p:sp>
+      <p:sp>
+        <p:nvSpPr>
+          <p:cNvPr id="4" name="Slide Number Placeholder 3"/>
+          <p:cNvSpPr>
+            <a:spLocks noGrp="1"/>
+          </p:cNvSpPr>
+          <p:nvPr>
+            <p:ph type="sldNum" sz="quarter" idx="10"/>
+          </p:nvPr>
+        </p:nvSpPr>
+        <p:spPr/>
+        <p:txBody>
+          <a:bodyPr/>
+          <a:lstStyle/>
+          <a:p>
+            <a:fld id="{C4AC0521-0938-4E7C-B440-EFBADEF5D8F8}" type="slidenum">
+              <a:rPr lang="en-US" smtClean="0">
+                <a:solidFill>
+                  <a:prstClr val="black"/>
+                </a:solidFill>
+              </a:rPr>
+              <a:pPr/>
+              <a:t>18</a:t>
             </a:fld>
             <a:endParaRPr lang="en-US">
               <a:solidFill>
@@ -1056,7 +1149,11 @@
             </a:r>
             <a:r>
               <a:rPr lang="en-US" baseline="0" dirty="0" smtClean="0"/>
-              <a:t> Card is then added to the specified slot. The </a:t>
+              <a:t> Card is then added to the specified slot. </a:t>
+            </a:r>
+            <a:r>
+              <a:rPr lang="en-US" baseline="0" dirty="0" smtClean="0"/>
+              <a:t>Also the backplane LEDs will be added to Slot 0. The </a:t>
             </a:r>
             <a:r>
               <a:rPr lang="en-US" b="1" baseline="0" dirty="0" smtClean="0"/>
@@ -10642,8 +10739,24 @@
             <a:pPr lvl="1"/>
             <a:r>
               <a:rPr lang="en-US" dirty="0"/>
-              <a:t>Fault Insertion (FIU)</a:t>
-            </a:r>
+              <a:t>Fault Insertion (FIU</a:t>
+            </a:r>
+            <a:r>
+              <a:rPr lang="en-US" dirty="0" smtClean="0"/>
+              <a:t>)</a:t>
+            </a:r>
+          </a:p>
+          <a:p>
+            <a:pPr lvl="1"/>
+            <a:r>
+              <a:rPr lang="en-US" dirty="0"/>
+              <a:t>LED Backplane (LED</a:t>
+            </a:r>
+            <a:r>
+              <a:rPr lang="en-US" dirty="0" smtClean="0"/>
+              <a:t>)</a:t>
+            </a:r>
+            <a:endParaRPr lang="en-US" dirty="0"/>
           </a:p>
           <a:p>
             <a:pPr lvl="1"/>
@@ -11059,6 +11172,114 @@
           <a:p>
             <a:r>
               <a:rPr lang="en-US" dirty="0" smtClean="0"/>
+              <a:t>LED Backplane</a:t>
+            </a:r>
+            <a:endParaRPr lang="en-US" dirty="0"/>
+          </a:p>
+        </p:txBody>
+      </p:sp>
+      <p:sp>
+        <p:nvSpPr>
+          <p:cNvPr id="3" name="Content Placeholder 2"/>
+          <p:cNvSpPr>
+            <a:spLocks noGrp="1"/>
+          </p:cNvSpPr>
+          <p:nvPr>
+            <p:ph idx="1"/>
+          </p:nvPr>
+        </p:nvSpPr>
+        <p:spPr/>
+        <p:txBody>
+          <a:bodyPr/>
+          <a:lstStyle/>
+          <a:p>
+            <a:r>
+              <a:rPr lang="en-US" b="1" dirty="0" smtClean="0"/>
+              <a:t>Purpose</a:t>
+            </a:r>
+            <a:endParaRPr lang="en-US" dirty="0"/>
+          </a:p>
+          <a:p>
+            <a:pPr lvl="1"/>
+            <a:r>
+              <a:rPr lang="en-US" dirty="0" smtClean="0"/>
+              <a:t>Illuminate 8 LEDs on the racks through the backplane</a:t>
+            </a:r>
+            <a:endParaRPr lang="en-US" dirty="0"/>
+          </a:p>
+        </p:txBody>
+      </p:sp>
+      <p:pic>
+        <p:nvPicPr>
+          <p:cNvPr id="4" name="Picture 3"/>
+          <p:cNvPicPr>
+            <a:picLocks noChangeAspect="1"/>
+          </p:cNvPicPr>
+          <p:nvPr/>
+        </p:nvPicPr>
+        <p:blipFill>
+          <a:blip r:embed="rId3"/>
+          <a:stretch>
+            <a:fillRect/>
+          </a:stretch>
+        </p:blipFill>
+        <p:spPr>
+          <a:xfrm>
+            <a:off x="2023353" y="1963373"/>
+            <a:ext cx="5534870" cy="4121482"/>
+          </a:xfrm>
+          <a:prstGeom prst="rect">
+            <a:avLst/>
+          </a:prstGeom>
+        </p:spPr>
+      </p:pic>
+    </p:spTree>
+    <p:extLst>
+      <p:ext uri="{BB962C8B-B14F-4D97-AF65-F5344CB8AC3E}">
+        <p14:creationId xmlns:p14="http://schemas.microsoft.com/office/powerpoint/2010/main" val="1098706705"/>
+      </p:ext>
+    </p:extLst>
+  </p:cSld>
+  <p:clrMapOvr>
+    <a:masterClrMapping/>
+  </p:clrMapOvr>
+</p:sld>
+</file>
+
+<file path=ppt/slides/slide17.xml><?xml version="1.0" encoding="utf-8"?>
+<p:sld xmlns:a="http://schemas.openxmlformats.org/drawingml/2006/main" xmlns:r="http://schemas.openxmlformats.org/officeDocument/2006/relationships" xmlns:p="http://schemas.openxmlformats.org/presentationml/2006/main">
+  <p:cSld>
+    <p:spTree>
+      <p:nvGrpSpPr>
+        <p:cNvPr id="1" name=""/>
+        <p:cNvGrpSpPr/>
+        <p:nvPr/>
+      </p:nvGrpSpPr>
+      <p:grpSpPr>
+        <a:xfrm>
+          <a:off x="0" y="0"/>
+          <a:ext cx="0" cy="0"/>
+          <a:chOff x="0" y="0"/>
+          <a:chExt cx="0" cy="0"/>
+        </a:xfrm>
+      </p:grpSpPr>
+      <p:sp>
+        <p:nvSpPr>
+          <p:cNvPr id="2" name="Title 1"/>
+          <p:cNvSpPr>
+            <a:spLocks noGrp="1"/>
+          </p:cNvSpPr>
+          <p:nvPr>
+            <p:ph type="title"/>
+          </p:nvPr>
+        </p:nvSpPr>
+        <p:spPr/>
+        <p:txBody>
+          <a:bodyPr/>
+          <a:lstStyle/>
+          <a:p>
+            <a:r>
+              <a:rPr lang="en-US" dirty="0" smtClean="0"/>
               <a:t>Simulated Resistance (</a:t>
             </a:r>
             <a:r>
@@ -11149,7 +11370,7 @@
 </p:sld>
 </file>
 
-<file path=ppt/slides/slide17.xml><?xml version="1.0" encoding="utf-8"?>
+<file path=ppt/slides/slide18.xml><?xml version="1.0" encoding="utf-8"?>
 <p:sld xmlns:a="http://schemas.openxmlformats.org/drawingml/2006/main" xmlns:r="http://schemas.openxmlformats.org/officeDocument/2006/relationships" xmlns:p="http://schemas.openxmlformats.org/presentationml/2006/main">
   <p:cSld>
     <p:spTree>
@@ -11546,8 +11767,12 @@
           <a:p>
             <a:pPr lvl="2"/>
             <a:r>
+              <a:rPr lang="en-US" dirty="0" smtClean="0"/>
+              <a:t>Oxygen </a:t>
+            </a:r>
+            <a:r>
               <a:rPr lang="en-US" dirty="0"/>
-              <a:t>Oxygen Sensor Calibration (UEGO</a:t>
+              <a:t>Sensor Calibration (UEGO</a:t>
             </a:r>
             <a:r>
               <a:rPr lang="en-US" dirty="0" smtClean="0"/>
@@ -11594,8 +11819,24 @@
             <a:pPr lvl="2"/>
             <a:r>
               <a:rPr lang="en-US" dirty="0" smtClean="0"/>
-              <a:t>Fault Insertion (FIU)</a:t>
-            </a:r>
+              <a:t>Fault Insertion (FIU</a:t>
+            </a:r>
+            <a:r>
+              <a:rPr lang="en-US" dirty="0" smtClean="0"/>
+              <a:t>)</a:t>
+            </a:r>
+          </a:p>
+          <a:p>
+            <a:pPr lvl="2"/>
+            <a:r>
+              <a:rPr lang="en-US" dirty="0"/>
+              <a:t>LED Backplane (LED</a:t>
+            </a:r>
+            <a:r>
+              <a:rPr lang="en-US" dirty="0" smtClean="0"/>
+              <a:t>)</a:t>
+            </a:r>
+            <a:endParaRPr lang="en-US" dirty="0" smtClean="0"/>
           </a:p>
           <a:p>
             <a:pPr lvl="2"/>
@@ -11753,7 +11994,7 @@
       </p:sp>
       <p:pic>
         <p:nvPicPr>
-          <p:cNvPr id="4" name="Picture 3"/>
+          <p:cNvPr id="3" name="Picture 2"/>
           <p:cNvPicPr>
             <a:picLocks noChangeAspect="1"/>
           </p:cNvPicPr>
@@ -11767,58 +12008,14 @@
         </p:blipFill>
         <p:spPr>
           <a:xfrm>
-            <a:off x="1295535" y="1106921"/>
-            <a:ext cx="6559280" cy="4874796"/>
+            <a:off x="1317473" y="1106921"/>
+            <a:ext cx="6515403" cy="4824817"/>
           </a:xfrm>
           <a:prstGeom prst="rect">
             <a:avLst/>
           </a:prstGeom>
         </p:spPr>
       </p:pic>
-      <p:sp>
-        <p:nvSpPr>
-          <p:cNvPr id="6" name="Rectangle 5"/>
-          <p:cNvSpPr/>
-          <p:nvPr/>
-        </p:nvSpPr>
-        <p:spPr>
-          <a:xfrm>
-            <a:off x="3570051" y="2461099"/>
-            <a:ext cx="1916349" cy="2140084"/>
-          </a:xfrm>
-          <a:prstGeom prst="rect">
-            <a:avLst/>
-          </a:prstGeom>
-          <a:noFill/>
-          <a:ln>
-            <a:solidFill>
-              <a:srgbClr val="FF0000"/>
-            </a:solidFill>
-          </a:ln>
-        </p:spPr>
-        <p:style>
-          <a:lnRef idx="2">
-            <a:schemeClr val="accent2"/>
-          </a:lnRef>
-          <a:fillRef idx="1">
-            <a:schemeClr val="lt1"/>
-          </a:fillRef>
-          <a:effectRef idx="0">
-            <a:schemeClr val="accent2"/>
-          </a:effectRef>
-          <a:fontRef idx="minor">
-            <a:schemeClr val="dk1"/>
-          </a:fontRef>
-        </p:style>
-        <p:txBody>
-          <a:bodyPr rtlCol="0" anchor="ctr"/>
-          <a:lstStyle/>
-          <a:p>
-            <a:pPr algn="ctr"/>
-            <a:endParaRPr lang="en-US"/>
-          </a:p>
-        </p:txBody>
-      </p:sp>
     </p:spTree>
     <p:extLst>
       <p:ext uri="{BB962C8B-B14F-4D97-AF65-F5344CB8AC3E}">
@@ -11874,7 +12071,7 @@
       </p:sp>
       <p:pic>
         <p:nvPicPr>
-          <p:cNvPr id="3" name="Picture 2"/>
+          <p:cNvPr id="4" name="Picture 3"/>
           <p:cNvPicPr>
             <a:picLocks noChangeAspect="1"/>
           </p:cNvPicPr>
@@ -11888,8 +12085,8 @@
         </p:blipFill>
         <p:spPr>
           <a:xfrm>
-            <a:off x="1007735" y="953311"/>
-            <a:ext cx="6981307" cy="5185146"/>
+            <a:off x="1079769" y="1028154"/>
+            <a:ext cx="6741269" cy="5006865"/>
           </a:xfrm>
           <a:prstGeom prst="rect">
             <a:avLst/>

</xml_diff>

<commit_message>
Corrected SPI calls to various cards. Updated Glyphs. Added Logic Threshold Channels.
</commit_message>
<xml_diff>
--- a/Documentation/SLSC Configuration Custom Device.pptx
+++ b/Documentation/SLSC Configuration Custom Device.pptx
@@ -253,7 +253,7 @@
           <a:p>
             <a:fld id="{6F64EA44-E7B4-4E71-B65C-EAE4DEE08EEF}" type="datetimeFigureOut">
               <a:rPr lang="en-US" smtClean="0"/>
-              <a:t>6/3/2015</a:t>
+              <a:t>6/4/2015</a:t>
             </a:fld>
             <a:endParaRPr lang="en-US"/>
           </a:p>
@@ -1149,11 +1149,7 @@
             </a:r>
             <a:r>
               <a:rPr lang="en-US" baseline="0" dirty="0" smtClean="0"/>
-              <a:t> Card is then added to the specified slot. </a:t>
-            </a:r>
-            <a:r>
-              <a:rPr lang="en-US" baseline="0" dirty="0" smtClean="0"/>
-              <a:t>Also the backplane LEDs will be added to Slot 0. The </a:t>
+              <a:t> Card is then added to the specified slot. Also the backplane LEDs will be added to Slot 0. The </a:t>
             </a:r>
             <a:r>
               <a:rPr lang="en-US" b="1" baseline="0" dirty="0" smtClean="0"/>
@@ -11059,12 +11055,8 @@
               <a:t>Fault Insertion (</a:t>
             </a:r>
             <a:r>
-              <a:rPr lang="en-US" dirty="0"/>
-              <a:t>LS-2-2611/LS-2-2610</a:t>
-            </a:r>
-            <a:r>
-              <a:rPr lang="en-US" dirty="0" smtClean="0"/>
-              <a:t>)</a:t>
+              <a:rPr lang="en-US" dirty="0" smtClean="0"/>
+              <a:t>LS-2-2501/LS-2-2502)</a:t>
             </a:r>
             <a:endParaRPr lang="en-US" dirty="0"/>
           </a:p>
@@ -11819,11 +11811,7 @@
             <a:pPr lvl="2"/>
             <a:r>
               <a:rPr lang="en-US" dirty="0" smtClean="0"/>
-              <a:t>Fault Insertion (FIU</a:t>
-            </a:r>
-            <a:r>
-              <a:rPr lang="en-US" dirty="0" smtClean="0"/>
-              <a:t>)</a:t>
+              <a:t>Fault Insertion (FIU)</a:t>
             </a:r>
           </a:p>
           <a:p>
@@ -11836,7 +11824,6 @@
               <a:rPr lang="en-US" dirty="0" smtClean="0"/>
               <a:t>)</a:t>
             </a:r>
-            <a:endParaRPr lang="en-US" dirty="0" smtClean="0"/>
           </a:p>
           <a:p>
             <a:pPr lvl="2"/>

</xml_diff>

<commit_message>
Updated with dynamic DIO threshold logic levels.
</commit_message>
<xml_diff>
--- a/Documentation/SLSC Configuration Custom Device.pptx
+++ b/Documentation/SLSC Configuration Custom Device.pptx
@@ -21,12 +21,12 @@
     <p:sldId id="271" r:id="rId12"/>
     <p:sldId id="264" r:id="rId13"/>
     <p:sldId id="263" r:id="rId14"/>
-    <p:sldId id="259" r:id="rId15"/>
-    <p:sldId id="265" r:id="rId16"/>
-    <p:sldId id="266" r:id="rId17"/>
-    <p:sldId id="267" r:id="rId18"/>
-    <p:sldId id="268" r:id="rId19"/>
-    <p:sldId id="273" r:id="rId20"/>
+    <p:sldId id="265" r:id="rId15"/>
+    <p:sldId id="266" r:id="rId16"/>
+    <p:sldId id="267" r:id="rId17"/>
+    <p:sldId id="268" r:id="rId18"/>
+    <p:sldId id="273" r:id="rId19"/>
+    <p:sldId id="274" r:id="rId20"/>
     <p:sldId id="269" r:id="rId21"/>
     <p:sldId id="270" r:id="rId22"/>
   </p:sldIdLst>
@@ -253,7 +253,7 @@
           <a:p>
             <a:fld id="{6F64EA44-E7B4-4E71-B65C-EAE4DEE08EEF}" type="datetimeFigureOut">
               <a:rPr lang="en-US" smtClean="0"/>
-              <a:t>6/4/2015</a:t>
+              <a:t>6/8/2015</a:t>
             </a:fld>
             <a:endParaRPr lang="en-US"/>
           </a:p>
@@ -701,14 +701,38 @@
           <a:bodyPr/>
           <a:lstStyle/>
           <a:p>
-            <a:r>
-              <a:rPr lang="en-US" dirty="0" smtClean="0"/>
-              <a:t>LEDs</a:t>
+            <a:pPr marL="0" marR="0" indent="0" algn="l" defTabSz="914400" rtl="0" eaLnBrk="1" fontAlgn="auto" latinLnBrk="0" hangingPunct="1">
+              <a:lnSpc>
+                <a:spcPct val="100000"/>
+              </a:lnSpc>
+              <a:spcBef>
+                <a:spcPts val="0"/>
+              </a:spcBef>
+              <a:spcAft>
+                <a:spcPts val="0"/>
+              </a:spcAft>
+              <a:buClrTx/>
+              <a:buSzTx/>
+              <a:buFontTx/>
+              <a:buNone/>
+              <a:tabLst/>
+              <a:defRPr/>
+            </a:pPr>
+            <a:r>
+              <a:rPr lang="en-US" dirty="0" smtClean="0"/>
+              <a:t>The DIO card is used to set the digital lines to either inputs or outputs. It also is responsible for setting the logic threshold for</a:t>
             </a:r>
             <a:r>
               <a:rPr lang="en-US" baseline="0" dirty="0" smtClean="0"/>
-              <a:t> on the backplane are for user feedback. The user can map digital lines to these LEDs.</a:t>
-            </a:r>
+              <a:t> the pins. The logic threshold determines the voltage level of the pins relative to the reference voltage. </a:t>
+            </a:r>
+            <a:r>
+              <a:rPr lang="en-US" b="0" baseline="0" dirty="0" smtClean="0"/>
+              <a:t>The user may also change the rack and slot position.</a:t>
+            </a:r>
+            <a:endParaRPr lang="en-US" b="1" dirty="0" smtClean="0"/>
+          </a:p>
+          <a:p>
             <a:endParaRPr lang="en-US" dirty="0"/>
           </a:p>
         </p:txBody>
@@ -739,7 +763,7 @@
     </p:spTree>
     <p:extLst>
       <p:ext uri="{BB962C8B-B14F-4D97-AF65-F5344CB8AC3E}">
-        <p14:creationId xmlns:p14="http://schemas.microsoft.com/office/powerpoint/2010/main" val="600098286"/>
+        <p14:creationId xmlns:p14="http://schemas.microsoft.com/office/powerpoint/2010/main" val="2390433722"/>
       </p:ext>
     </p:extLst>
   </p:cSld>
@@ -1594,11 +1618,11 @@
             </a:pPr>
             <a:r>
               <a:rPr lang="en-US" dirty="0" smtClean="0"/>
-              <a:t>The DIO card is used to set the digital lines to either inputs or outputs. It also is responsible for setting the logic threshold for</a:t>
+              <a:t>The Battery Switch</a:t>
             </a:r>
             <a:r>
               <a:rPr lang="en-US" baseline="0" dirty="0" smtClean="0"/>
-              <a:t> the pins. The logic threshold determines the voltage level of the pins relative to the reference voltage. </a:t>
+              <a:t> card is used to switch the output to battery power or not. You can set the initial state for each of the 3 switches in the main page of the Battery Switch card or you can update the switches individually in the channels. </a:t>
             </a:r>
             <a:r>
               <a:rPr lang="en-US" b="0" baseline="0" dirty="0" smtClean="0"/>
@@ -1607,7 +1631,7 @@
             <a:endParaRPr lang="en-US" b="1" dirty="0" smtClean="0"/>
           </a:p>
           <a:p>
-            <a:endParaRPr lang="en-US" dirty="0"/>
+            <a:endParaRPr lang="en-US" b="1" dirty="0"/>
           </a:p>
         </p:txBody>
       </p:sp>
@@ -1627,17 +1651,26 @@
           <a:lstStyle/>
           <a:p>
             <a:fld id="{C4AC0521-0938-4E7C-B440-EFBADEF5D8F8}" type="slidenum">
-              <a:rPr lang="en-US" smtClean="0"/>
-              <a:t>11</a:t>
+              <a:rPr lang="en-US" smtClean="0">
+                <a:solidFill>
+                  <a:prstClr val="black"/>
+                </a:solidFill>
+              </a:rPr>
+              <a:pPr/>
+              <a:t>12</a:t>
             </a:fld>
-            <a:endParaRPr lang="en-US"/>
+            <a:endParaRPr lang="en-US">
+              <a:solidFill>
+                <a:prstClr val="black"/>
+              </a:solidFill>
+            </a:endParaRPr>
           </a:p>
         </p:txBody>
       </p:sp>
     </p:spTree>
     <p:extLst>
       <p:ext uri="{BB962C8B-B14F-4D97-AF65-F5344CB8AC3E}">
-        <p14:creationId xmlns:p14="http://schemas.microsoft.com/office/powerpoint/2010/main" val="2698231418"/>
+        <p14:creationId xmlns:p14="http://schemas.microsoft.com/office/powerpoint/2010/main" val="1206809262"/>
       </p:ext>
     </p:extLst>
   </p:cSld>
@@ -1710,11 +1743,39 @@
             </a:pPr>
             <a:r>
               <a:rPr lang="en-US" dirty="0" smtClean="0"/>
-              <a:t>The Battery Switch</a:t>
+              <a:t>This</a:t>
             </a:r>
             <a:r>
               <a:rPr lang="en-US" baseline="0" dirty="0" smtClean="0"/>
-              <a:t> card is used to switch the output to battery power or not. You can set the initial state for each of the 3 switches in the main page of the Battery Switch card or you can update the switches individually in the channels. </a:t>
+              <a:t> card places individual channels in calibration mode in order to get the gain multiplier needed for the AI channels. The user can select </a:t>
+            </a:r>
+            <a:r>
+              <a:rPr lang="en-US" b="1" baseline="0" dirty="0" smtClean="0"/>
+              <a:t>Inactive</a:t>
+            </a:r>
+            <a:r>
+              <a:rPr lang="en-US" baseline="0" dirty="0" smtClean="0"/>
+              <a:t> which turns off calibration mode. The user also select Channels 1-16 to set place individual channels in calibration mode. It is recommended that the user create a calibration routine which sets the </a:t>
+            </a:r>
+            <a:r>
+              <a:rPr lang="en-US" b="1" baseline="0" dirty="0" smtClean="0"/>
+              <a:t>Calibration State </a:t>
+            </a:r>
+            <a:r>
+              <a:rPr lang="en-US" b="0" baseline="0" dirty="0" smtClean="0"/>
+              <a:t>to channels 1-16 for 100 </a:t>
+            </a:r>
+            <a:r>
+              <a:rPr lang="en-US" b="0" baseline="0" dirty="0" err="1" smtClean="0"/>
+              <a:t>ms</a:t>
+            </a:r>
+            <a:r>
+              <a:rPr lang="en-US" b="0" baseline="0" dirty="0" smtClean="0"/>
+              <a:t> to get the gain multipliers for each channel in a separate system definition. Then pull those values as Scales in the full system definition.</a:t>
+            </a:r>
+            <a:r>
+              <a:rPr lang="en-US" baseline="0" dirty="0" smtClean="0"/>
+              <a:t> </a:t>
             </a:r>
             <a:r>
               <a:rPr lang="en-US" b="0" baseline="0" dirty="0" smtClean="0"/>
@@ -1762,7 +1823,7 @@
     </p:spTree>
     <p:extLst>
       <p:ext uri="{BB962C8B-B14F-4D97-AF65-F5344CB8AC3E}">
-        <p14:creationId xmlns:p14="http://schemas.microsoft.com/office/powerpoint/2010/main" val="1206809262"/>
+        <p14:creationId xmlns:p14="http://schemas.microsoft.com/office/powerpoint/2010/main" val="2213236472"/>
       </p:ext>
     </p:extLst>
   </p:cSld>
@@ -1816,6 +1877,41 @@
           <a:bodyPr/>
           <a:lstStyle/>
           <a:p>
+            <a:pPr marL="0" marR="0" lvl="3" indent="0" algn="l" defTabSz="914400" rtl="0" eaLnBrk="1" fontAlgn="auto" latinLnBrk="0" hangingPunct="1">
+              <a:lnSpc>
+                <a:spcPct val="100000"/>
+              </a:lnSpc>
+              <a:spcBef>
+                <a:spcPts val="0"/>
+              </a:spcBef>
+              <a:spcAft>
+                <a:spcPts val="0"/>
+              </a:spcAft>
+              <a:buClrTx/>
+              <a:buSzTx/>
+              <a:buFontTx/>
+              <a:buNone/>
+              <a:tabLst/>
+              <a:defRPr/>
+            </a:pPr>
+            <a:r>
+              <a:rPr lang="en-US" dirty="0" smtClean="0"/>
+              <a:t>The FIU </a:t>
+            </a:r>
+            <a:r>
+              <a:rPr lang="en-US" baseline="0" dirty="0" smtClean="0"/>
+              <a:t>card is used to set the fault states of up to 8 channels. </a:t>
+            </a:r>
+            <a:r>
+              <a:rPr lang="en-US" sz="1400" baseline="0" dirty="0" smtClean="0"/>
+              <a:t>Fault states can be </a:t>
+            </a:r>
+            <a:r>
+              <a:rPr lang="en-US" sz="1400" dirty="0" smtClean="0"/>
+              <a:t>No Fault Output 1, Open Circuit 100 Hz, Ground 100 Hz, Open Circuit, Ground, Fail Rail 1, Fail Rail 2, and No Fault Output 2. </a:t>
+            </a:r>
+          </a:p>
+          <a:p>
             <a:pPr marL="0" marR="0" indent="0" algn="l" defTabSz="914400" rtl="0" eaLnBrk="1" fontAlgn="auto" latinLnBrk="0" hangingPunct="1">
               <a:lnSpc>
                 <a:spcPct val="100000"/>
@@ -1834,40 +1930,8 @@
               <a:defRPr/>
             </a:pPr>
             <a:r>
-              <a:rPr lang="en-US" dirty="0" smtClean="0"/>
-              <a:t>This</a:t>
-            </a:r>
-            <a:r>
               <a:rPr lang="en-US" baseline="0" dirty="0" smtClean="0"/>
-              <a:t> card places individual channels in calibration mode in order to get the gain multiplier needed for the AI channels. The user can select </a:t>
-            </a:r>
-            <a:r>
-              <a:rPr lang="en-US" b="1" baseline="0" dirty="0" smtClean="0"/>
-              <a:t>Inactive</a:t>
-            </a:r>
-            <a:r>
-              <a:rPr lang="en-US" baseline="0" dirty="0" smtClean="0"/>
-              <a:t> which turns off calibration mode. The user also select Channels 1-16 to set place individual channels in calibration mode. It is recommended that the user create a calibration routine which sets the </a:t>
-            </a:r>
-            <a:r>
-              <a:rPr lang="en-US" b="1" baseline="0" dirty="0" smtClean="0"/>
-              <a:t>Calibration State </a:t>
-            </a:r>
-            <a:r>
-              <a:rPr lang="en-US" b="0" baseline="0" dirty="0" smtClean="0"/>
-              <a:t>to channels 1-16 for 100 </a:t>
-            </a:r>
-            <a:r>
-              <a:rPr lang="en-US" b="0" baseline="0" dirty="0" err="1" smtClean="0"/>
-              <a:t>ms</a:t>
-            </a:r>
-            <a:r>
-              <a:rPr lang="en-US" b="0" baseline="0" dirty="0" smtClean="0"/>
-              <a:t> to get the gain multipliers for each channel in a separate system definition. Then pull those values as Scales in the full system definition.</a:t>
-            </a:r>
-            <a:r>
-              <a:rPr lang="en-US" baseline="0" dirty="0" smtClean="0"/>
-              <a:t> </a:t>
+              <a:t>You can set the initial state for each of the 8 faults in the main page of the FIU card or you can update the fault states individually in the channels. </a:t>
             </a:r>
             <a:r>
               <a:rPr lang="en-US" b="0" baseline="0" dirty="0" smtClean="0"/>
@@ -1915,7 +1979,7 @@
     </p:spTree>
     <p:extLst>
       <p:ext uri="{BB962C8B-B14F-4D97-AF65-F5344CB8AC3E}">
-        <p14:creationId xmlns:p14="http://schemas.microsoft.com/office/powerpoint/2010/main" val="2213236472"/>
+        <p14:creationId xmlns:p14="http://schemas.microsoft.com/office/powerpoint/2010/main" val="1117330947"/>
       </p:ext>
     </p:extLst>
   </p:cSld>
@@ -1969,70 +2033,15 @@
           <a:bodyPr/>
           <a:lstStyle/>
           <a:p>
-            <a:pPr marL="0" marR="0" lvl="3" indent="0" algn="l" defTabSz="914400" rtl="0" eaLnBrk="1" fontAlgn="auto" latinLnBrk="0" hangingPunct="1">
-              <a:lnSpc>
-                <a:spcPct val="100000"/>
-              </a:lnSpc>
-              <a:spcBef>
-                <a:spcPts val="0"/>
-              </a:spcBef>
-              <a:spcAft>
-                <a:spcPts val="0"/>
-              </a:spcAft>
-              <a:buClrTx/>
-              <a:buSzTx/>
-              <a:buFontTx/>
-              <a:buNone/>
-              <a:tabLst/>
-              <a:defRPr/>
-            </a:pPr>
-            <a:r>
-              <a:rPr lang="en-US" dirty="0" smtClean="0"/>
-              <a:t>The FIU </a:t>
+            <a:r>
+              <a:rPr lang="en-US" dirty="0" smtClean="0"/>
+              <a:t>LEDs</a:t>
             </a:r>
             <a:r>
               <a:rPr lang="en-US" baseline="0" dirty="0" smtClean="0"/>
-              <a:t>card is used to set the fault states of up to 8 channels. </a:t>
-            </a:r>
-            <a:r>
-              <a:rPr lang="en-US" sz="1400" baseline="0" dirty="0" smtClean="0"/>
-              <a:t>Fault states can be </a:t>
-            </a:r>
-            <a:r>
-              <a:rPr lang="en-US" sz="1400" dirty="0" smtClean="0"/>
-              <a:t>No Fault Output 1, Open Circuit 100 Hz, Ground 100 Hz, Open Circuit, Ground, Fail Rail 1, Fail Rail 2, and No Fault Output 2. </a:t>
-            </a:r>
-          </a:p>
-          <a:p>
-            <a:pPr marL="0" marR="0" indent="0" algn="l" defTabSz="914400" rtl="0" eaLnBrk="1" fontAlgn="auto" latinLnBrk="0" hangingPunct="1">
-              <a:lnSpc>
-                <a:spcPct val="100000"/>
-              </a:lnSpc>
-              <a:spcBef>
-                <a:spcPts val="0"/>
-              </a:spcBef>
-              <a:spcAft>
-                <a:spcPts val="0"/>
-              </a:spcAft>
-              <a:buClrTx/>
-              <a:buSzTx/>
-              <a:buFontTx/>
-              <a:buNone/>
-              <a:tabLst/>
-              <a:defRPr/>
-            </a:pPr>
-            <a:r>
-              <a:rPr lang="en-US" baseline="0" dirty="0" smtClean="0"/>
-              <a:t>You can set the initial state for each of the 8 faults in the main page of the FIU card or you can update the fault states individually in the channels. </a:t>
-            </a:r>
-            <a:r>
-              <a:rPr lang="en-US" b="0" baseline="0" dirty="0" smtClean="0"/>
-              <a:t>The user may also change the rack and slot position.</a:t>
-            </a:r>
-            <a:endParaRPr lang="en-US" b="1" dirty="0" smtClean="0"/>
-          </a:p>
-          <a:p>
-            <a:endParaRPr lang="en-US" b="1" dirty="0"/>
+              <a:t> on the backplane are for user feedback. The user can map digital lines to these LEDs.</a:t>
+            </a:r>
+            <a:endParaRPr lang="en-US" dirty="0"/>
           </a:p>
         </p:txBody>
       </p:sp>
@@ -2052,26 +2061,17 @@
           <a:lstStyle/>
           <a:p>
             <a:fld id="{C4AC0521-0938-4E7C-B440-EFBADEF5D8F8}" type="slidenum">
-              <a:rPr lang="en-US" smtClean="0">
-                <a:solidFill>
-                  <a:prstClr val="black"/>
-                </a:solidFill>
-              </a:rPr>
-              <a:pPr/>
+              <a:rPr lang="en-US" smtClean="0"/>
               <a:t>15</a:t>
             </a:fld>
-            <a:endParaRPr lang="en-US">
-              <a:solidFill>
-                <a:prstClr val="black"/>
-              </a:solidFill>
-            </a:endParaRPr>
+            <a:endParaRPr lang="en-US"/>
           </a:p>
         </p:txBody>
       </p:sp>
     </p:spTree>
     <p:extLst>
       <p:ext uri="{BB962C8B-B14F-4D97-AF65-F5344CB8AC3E}">
-        <p14:creationId xmlns:p14="http://schemas.microsoft.com/office/powerpoint/2010/main" val="1117330947"/>
+        <p14:creationId xmlns:p14="http://schemas.microsoft.com/office/powerpoint/2010/main" val="600098286"/>
       </p:ext>
     </p:extLst>
   </p:cSld>
@@ -10562,15 +10562,7 @@
           <a:p>
             <a:r>
               <a:rPr lang="en-US" dirty="0" smtClean="0"/>
-              <a:t>Digital </a:t>
-            </a:r>
-            <a:r>
-              <a:rPr lang="en-US" dirty="0" err="1" smtClean="0"/>
-              <a:t>Input/Output</a:t>
-            </a:r>
-            <a:r>
-              <a:rPr lang="en-US" dirty="0" smtClean="0"/>
-              <a:t> (LS-2-2101)</a:t>
+              <a:t>Dynamic Cards</a:t>
             </a:r>
             <a:endParaRPr lang="en-US" dirty="0"/>
           </a:p>
@@ -10592,121 +10584,6 @@
           <a:lstStyle/>
           <a:p>
             <a:r>
-              <a:rPr lang="en-US" b="1" dirty="0" smtClean="0"/>
-              <a:t>Purpose</a:t>
-            </a:r>
-            <a:endParaRPr lang="en-US" dirty="0" smtClean="0"/>
-          </a:p>
-          <a:p>
-            <a:pPr lvl="1"/>
-            <a:r>
-              <a:rPr lang="en-US" dirty="0" smtClean="0"/>
-              <a:t>Set the digital lines to be either inputs or outputs.</a:t>
-            </a:r>
-          </a:p>
-          <a:p>
-            <a:pPr lvl="1"/>
-            <a:r>
-              <a:rPr lang="en-US" dirty="0" smtClean="0"/>
-              <a:t>Sets the logic threshold of each bank of lines</a:t>
-            </a:r>
-            <a:endParaRPr lang="en-US" dirty="0"/>
-          </a:p>
-        </p:txBody>
-      </p:sp>
-      <p:pic>
-        <p:nvPicPr>
-          <p:cNvPr id="4" name="Picture 3"/>
-          <p:cNvPicPr>
-            <a:picLocks noChangeAspect="1"/>
-          </p:cNvPicPr>
-          <p:nvPr/>
-        </p:nvPicPr>
-        <p:blipFill>
-          <a:blip r:embed="rId3"/>
-          <a:stretch>
-            <a:fillRect/>
-          </a:stretch>
-        </p:blipFill>
-        <p:spPr>
-          <a:xfrm>
-            <a:off x="1889073" y="2188723"/>
-            <a:ext cx="5710863" cy="4241563"/>
-          </a:xfrm>
-          <a:prstGeom prst="rect">
-            <a:avLst/>
-          </a:prstGeom>
-        </p:spPr>
-      </p:pic>
-    </p:spTree>
-    <p:extLst>
-      <p:ext uri="{BB962C8B-B14F-4D97-AF65-F5344CB8AC3E}">
-        <p14:creationId xmlns:p14="http://schemas.microsoft.com/office/powerpoint/2010/main" val="2027654183"/>
-      </p:ext>
-    </p:extLst>
-  </p:cSld>
-  <p:clrMapOvr>
-    <a:masterClrMapping/>
-  </p:clrMapOvr>
-</p:sld>
-</file>
-
-<file path=ppt/slides/slide12.xml><?xml version="1.0" encoding="utf-8"?>
-<p:sld xmlns:a="http://schemas.openxmlformats.org/drawingml/2006/main" xmlns:r="http://schemas.openxmlformats.org/officeDocument/2006/relationships" xmlns:p="http://schemas.openxmlformats.org/presentationml/2006/main">
-  <p:cSld>
-    <p:spTree>
-      <p:nvGrpSpPr>
-        <p:cNvPr id="1" name=""/>
-        <p:cNvGrpSpPr/>
-        <p:nvPr/>
-      </p:nvGrpSpPr>
-      <p:grpSpPr>
-        <a:xfrm>
-          <a:off x="0" y="0"/>
-          <a:ext cx="0" cy="0"/>
-          <a:chOff x="0" y="0"/>
-          <a:chExt cx="0" cy="0"/>
-        </a:xfrm>
-      </p:grpSpPr>
-      <p:sp>
-        <p:nvSpPr>
-          <p:cNvPr id="2" name="Title 1"/>
-          <p:cNvSpPr>
-            <a:spLocks noGrp="1"/>
-          </p:cNvSpPr>
-          <p:nvPr>
-            <p:ph type="title"/>
-          </p:nvPr>
-        </p:nvSpPr>
-        <p:spPr/>
-        <p:txBody>
-          <a:bodyPr/>
-          <a:lstStyle/>
-          <a:p>
-            <a:r>
-              <a:rPr lang="en-US" dirty="0" smtClean="0"/>
-              <a:t>Dynamic Cards</a:t>
-            </a:r>
-            <a:endParaRPr lang="en-US" dirty="0"/>
-          </a:p>
-        </p:txBody>
-      </p:sp>
-      <p:sp>
-        <p:nvSpPr>
-          <p:cNvPr id="3" name="Content Placeholder 2"/>
-          <p:cNvSpPr>
-            <a:spLocks noGrp="1"/>
-          </p:cNvSpPr>
-          <p:nvPr>
-            <p:ph idx="1"/>
-          </p:nvPr>
-        </p:nvSpPr>
-        <p:spPr/>
-        <p:txBody>
-          <a:bodyPr/>
-          <a:lstStyle/>
-          <a:p>
-            <a:r>
               <a:rPr lang="en-US" dirty="0" smtClean="0"/>
               <a:t>Initial configuration occurs on deployment and can be changed while the system is still deployed</a:t>
             </a:r>
@@ -10747,6 +10624,25 @@
             <a:r>
               <a:rPr lang="en-US" dirty="0"/>
               <a:t>LED Backplane (LED</a:t>
+            </a:r>
+            <a:r>
+              <a:rPr lang="en-US" dirty="0" smtClean="0"/>
+              <a:t>)</a:t>
+            </a:r>
+          </a:p>
+          <a:p>
+            <a:pPr lvl="1"/>
+            <a:r>
+              <a:rPr lang="en-US" dirty="0"/>
+              <a:t>Digital </a:t>
+            </a:r>
+            <a:r>
+              <a:rPr lang="en-US" dirty="0" err="1"/>
+              <a:t>Input/Output</a:t>
+            </a:r>
+            <a:r>
+              <a:rPr lang="en-US" dirty="0"/>
+              <a:t> (DIO</a:t>
             </a:r>
             <a:r>
               <a:rPr lang="en-US" dirty="0" smtClean="0"/>
@@ -10786,7 +10682,7 @@
 </p:sld>
 </file>
 
-<file path=ppt/slides/slide13.xml><?xml version="1.0" encoding="utf-8"?>
+<file path=ppt/slides/slide12.xml><?xml version="1.0" encoding="utf-8"?>
 <p:sld xmlns:a="http://schemas.openxmlformats.org/drawingml/2006/main" xmlns:r="http://schemas.openxmlformats.org/officeDocument/2006/relationships" xmlns:p="http://schemas.openxmlformats.org/presentationml/2006/main">
   <p:cSld>
     <p:spTree>
@@ -10902,7 +10798,7 @@
 </p:sld>
 </file>
 
-<file path=ppt/slides/slide14.xml><?xml version="1.0" encoding="utf-8"?>
+<file path=ppt/slides/slide13.xml><?xml version="1.0" encoding="utf-8"?>
 <p:sld xmlns:a="http://schemas.openxmlformats.org/drawingml/2006/main" xmlns:r="http://schemas.openxmlformats.org/officeDocument/2006/relationships" xmlns:p="http://schemas.openxmlformats.org/presentationml/2006/main">
   <p:cSld>
     <p:spTree>
@@ -11018,7 +10914,7 @@
 </p:sld>
 </file>
 
-<file path=ppt/slides/slide15.xml><?xml version="1.0" encoding="utf-8"?>
+<file path=ppt/slides/slide14.xml><?xml version="1.0" encoding="utf-8"?>
 <p:sld xmlns:a="http://schemas.openxmlformats.org/drawingml/2006/main" xmlns:r="http://schemas.openxmlformats.org/officeDocument/2006/relationships" xmlns:p="http://schemas.openxmlformats.org/presentationml/2006/main">
   <p:cSld>
     <p:spTree>
@@ -11052,11 +10948,7 @@
           <a:p>
             <a:r>
               <a:rPr lang="en-US" dirty="0" smtClean="0"/>
-              <a:t>Fault Insertion (</a:t>
-            </a:r>
-            <a:r>
-              <a:rPr lang="en-US" dirty="0" smtClean="0"/>
-              <a:t>LS-2-2501/LS-2-2502)</a:t>
+              <a:t>Fault Insertion (LS-2-2501/LS-2-2502)</a:t>
             </a:r>
             <a:endParaRPr lang="en-US" dirty="0"/>
           </a:p>
@@ -11095,7 +10987,7 @@
       </p:sp>
       <p:pic>
         <p:nvPicPr>
-          <p:cNvPr id="3" name="Picture 2"/>
+          <p:cNvPr id="4" name="Picture 3"/>
           <p:cNvPicPr>
             <a:picLocks noChangeAspect="1"/>
           </p:cNvPicPr>
@@ -11109,8 +11001,8 @@
         </p:blipFill>
         <p:spPr>
           <a:xfrm>
-            <a:off x="1959075" y="2091446"/>
-            <a:ext cx="5514401" cy="4095648"/>
+            <a:off x="1449421" y="1859919"/>
+            <a:ext cx="5839230" cy="4336904"/>
           </a:xfrm>
           <a:prstGeom prst="rect">
             <a:avLst/>
@@ -11130,7 +11022,7 @@
 </p:sld>
 </file>
 
-<file path=ppt/slides/slide16.xml><?xml version="1.0" encoding="utf-8"?>
+<file path=ppt/slides/slide15.xml><?xml version="1.0" encoding="utf-8"?>
 <p:sld xmlns:a="http://schemas.openxmlformats.org/drawingml/2006/main" xmlns:r="http://schemas.openxmlformats.org/officeDocument/2006/relationships" xmlns:p="http://schemas.openxmlformats.org/presentationml/2006/main">
   <p:cSld>
     <p:spTree>
@@ -11229,6 +11121,129 @@
     <p:extLst>
       <p:ext uri="{BB962C8B-B14F-4D97-AF65-F5344CB8AC3E}">
         <p14:creationId xmlns:p14="http://schemas.microsoft.com/office/powerpoint/2010/main" val="1098706705"/>
+      </p:ext>
+    </p:extLst>
+  </p:cSld>
+  <p:clrMapOvr>
+    <a:masterClrMapping/>
+  </p:clrMapOvr>
+</p:sld>
+</file>
+
+<file path=ppt/slides/slide16.xml><?xml version="1.0" encoding="utf-8"?>
+<p:sld xmlns:a="http://schemas.openxmlformats.org/drawingml/2006/main" xmlns:r="http://schemas.openxmlformats.org/officeDocument/2006/relationships" xmlns:p="http://schemas.openxmlformats.org/presentationml/2006/main">
+  <p:cSld>
+    <p:spTree>
+      <p:nvGrpSpPr>
+        <p:cNvPr id="1" name=""/>
+        <p:cNvGrpSpPr/>
+        <p:nvPr/>
+      </p:nvGrpSpPr>
+      <p:grpSpPr>
+        <a:xfrm>
+          <a:off x="0" y="0"/>
+          <a:ext cx="0" cy="0"/>
+          <a:chOff x="0" y="0"/>
+          <a:chExt cx="0" cy="0"/>
+        </a:xfrm>
+      </p:grpSpPr>
+      <p:sp>
+        <p:nvSpPr>
+          <p:cNvPr id="2" name="Title 1"/>
+          <p:cNvSpPr>
+            <a:spLocks noGrp="1"/>
+          </p:cNvSpPr>
+          <p:nvPr>
+            <p:ph type="title"/>
+          </p:nvPr>
+        </p:nvSpPr>
+        <p:spPr/>
+        <p:txBody>
+          <a:bodyPr/>
+          <a:lstStyle/>
+          <a:p>
+            <a:r>
+              <a:rPr lang="en-US" dirty="0" smtClean="0"/>
+              <a:t>Digital </a:t>
+            </a:r>
+            <a:r>
+              <a:rPr lang="en-US" dirty="0" err="1" smtClean="0"/>
+              <a:t>Input/Output</a:t>
+            </a:r>
+            <a:r>
+              <a:rPr lang="en-US" dirty="0" smtClean="0"/>
+              <a:t> (LS-2-2101)</a:t>
+            </a:r>
+            <a:endParaRPr lang="en-US" dirty="0"/>
+          </a:p>
+        </p:txBody>
+      </p:sp>
+      <p:sp>
+        <p:nvSpPr>
+          <p:cNvPr id="3" name="Content Placeholder 2"/>
+          <p:cNvSpPr>
+            <a:spLocks noGrp="1"/>
+          </p:cNvSpPr>
+          <p:nvPr>
+            <p:ph idx="1"/>
+          </p:nvPr>
+        </p:nvSpPr>
+        <p:spPr/>
+        <p:txBody>
+          <a:bodyPr/>
+          <a:lstStyle/>
+          <a:p>
+            <a:r>
+              <a:rPr lang="en-US" b="1" dirty="0" smtClean="0"/>
+              <a:t>Purpose</a:t>
+            </a:r>
+            <a:endParaRPr lang="en-US" dirty="0" smtClean="0"/>
+          </a:p>
+          <a:p>
+            <a:pPr lvl="1"/>
+            <a:r>
+              <a:rPr lang="en-US" dirty="0" smtClean="0"/>
+              <a:t>Set the digital lines to be either inputs or outputs.</a:t>
+            </a:r>
+          </a:p>
+          <a:p>
+            <a:pPr lvl="1"/>
+            <a:r>
+              <a:rPr lang="en-US" dirty="0" smtClean="0"/>
+              <a:t>Sets the logic threshold of each bank of lines</a:t>
+            </a:r>
+            <a:endParaRPr lang="en-US" dirty="0"/>
+          </a:p>
+        </p:txBody>
+      </p:sp>
+      <p:pic>
+        <p:nvPicPr>
+          <p:cNvPr id="5" name="Picture 4"/>
+          <p:cNvPicPr>
+            <a:picLocks noChangeAspect="1"/>
+          </p:cNvPicPr>
+          <p:nvPr/>
+        </p:nvPicPr>
+        <p:blipFill>
+          <a:blip r:embed="rId3"/>
+          <a:stretch>
+            <a:fillRect/>
+          </a:stretch>
+        </p:blipFill>
+        <p:spPr>
+          <a:xfrm>
+            <a:off x="1850717" y="2169267"/>
+            <a:ext cx="5448915" cy="4047010"/>
+          </a:xfrm>
+          <a:prstGeom prst="rect">
+            <a:avLst/>
+          </a:prstGeom>
+        </p:spPr>
+      </p:pic>
+    </p:spTree>
+    <p:extLst>
+      <p:ext uri="{BB962C8B-B14F-4D97-AF65-F5344CB8AC3E}">
+        <p14:creationId xmlns:p14="http://schemas.microsoft.com/office/powerpoint/2010/main" val="2828064707"/>
       </p:ext>
     </p:extLst>
   </p:cSld>
@@ -11772,26 +11787,12 @@
             </a:r>
           </a:p>
           <a:p>
-            <a:pPr lvl="2"/>
-            <a:r>
-              <a:rPr lang="en-US" dirty="0" smtClean="0"/>
-              <a:t>Digital </a:t>
-            </a:r>
-            <a:r>
-              <a:rPr lang="en-US" dirty="0" err="1" smtClean="0"/>
-              <a:t>Input/Output</a:t>
-            </a:r>
-            <a:r>
-              <a:rPr lang="en-US" dirty="0" smtClean="0"/>
-              <a:t> (DIO)</a:t>
-            </a:r>
-          </a:p>
-          <a:p>
             <a:pPr lvl="1"/>
             <a:r>
               <a:rPr lang="en-US" dirty="0" smtClean="0"/>
               <a:t>Dynamic</a:t>
             </a:r>
+            <a:endParaRPr lang="en-US" dirty="0" smtClean="0"/>
           </a:p>
           <a:p>
             <a:pPr lvl="2"/>
@@ -11824,6 +11825,30 @@
               <a:rPr lang="en-US" dirty="0" smtClean="0"/>
               <a:t>)</a:t>
             </a:r>
+          </a:p>
+          <a:p>
+            <a:pPr lvl="2"/>
+            <a:r>
+              <a:rPr lang="en-US" dirty="0"/>
+              <a:t>Digital </a:t>
+            </a:r>
+            <a:r>
+              <a:rPr lang="en-US" dirty="0" err="1"/>
+              <a:t>Input/Output</a:t>
+            </a:r>
+            <a:r>
+              <a:rPr lang="en-US" dirty="0"/>
+              <a:t> (</a:t>
+            </a:r>
+            <a:r>
+              <a:rPr lang="en-US" dirty="0" smtClean="0"/>
+              <a:t>DIO</a:t>
+            </a:r>
+            <a:r>
+              <a:rPr lang="en-US" dirty="0"/>
+              <a:t>)</a:t>
+            </a:r>
+            <a:endParaRPr lang="en-US" dirty="0" smtClean="0"/>
           </a:p>
           <a:p>
             <a:pPr lvl="2"/>
@@ -12374,21 +12399,6 @@
             <a:r>
               <a:rPr lang="en-US" dirty="0"/>
               <a:t>Sensor Calibration (UEGO)</a:t>
-            </a:r>
-          </a:p>
-          <a:p>
-            <a:pPr lvl="1"/>
-            <a:r>
-              <a:rPr lang="en-US" dirty="0"/>
-              <a:t>Digital </a:t>
-            </a:r>
-            <a:r>
-              <a:rPr lang="en-US" dirty="0" err="1"/>
-              <a:t>Input/Output</a:t>
-            </a:r>
-            <a:r>
-              <a:rPr lang="en-US" dirty="0"/>
-              <a:t> (DIO)</a:t>
             </a:r>
           </a:p>
           <a:p>

</xml_diff>